<commit_message>
updated slides, R script for containers
</commit_message>
<xml_diff>
--- a/slides/Progress of VM tests2.pptx
+++ b/slides/Progress of VM tests2.pptx
@@ -246,7 +246,7 @@
           <a:p>
             <a:fld id="{E463ECBD-872A-4504-A641-A42C97932560}" type="datetimeFigureOut">
               <a:rPr lang="en-GB" smtClean="0"/>
-              <a:t>26/09/2018</a:t>
+              <a:t>03/10/2018</a:t>
             </a:fld>
             <a:endParaRPr lang="en-GB"/>
           </a:p>
@@ -416,7 +416,7 @@
           <a:p>
             <a:fld id="{E463ECBD-872A-4504-A641-A42C97932560}" type="datetimeFigureOut">
               <a:rPr lang="en-GB" smtClean="0"/>
-              <a:t>26/09/2018</a:t>
+              <a:t>03/10/2018</a:t>
             </a:fld>
             <a:endParaRPr lang="en-GB"/>
           </a:p>
@@ -596,7 +596,7 @@
           <a:p>
             <a:fld id="{E463ECBD-872A-4504-A641-A42C97932560}" type="datetimeFigureOut">
               <a:rPr lang="en-GB" smtClean="0"/>
-              <a:t>26/09/2018</a:t>
+              <a:t>03/10/2018</a:t>
             </a:fld>
             <a:endParaRPr lang="en-GB"/>
           </a:p>
@@ -766,7 +766,7 @@
           <a:p>
             <a:fld id="{E463ECBD-872A-4504-A641-A42C97932560}" type="datetimeFigureOut">
               <a:rPr lang="en-GB" smtClean="0"/>
-              <a:t>26/09/2018</a:t>
+              <a:t>03/10/2018</a:t>
             </a:fld>
             <a:endParaRPr lang="en-GB"/>
           </a:p>
@@ -1012,7 +1012,7 @@
           <a:p>
             <a:fld id="{E463ECBD-872A-4504-A641-A42C97932560}" type="datetimeFigureOut">
               <a:rPr lang="en-GB" smtClean="0"/>
-              <a:t>26/09/2018</a:t>
+              <a:t>03/10/2018</a:t>
             </a:fld>
             <a:endParaRPr lang="en-GB"/>
           </a:p>
@@ -1244,7 +1244,7 @@
           <a:p>
             <a:fld id="{E463ECBD-872A-4504-A641-A42C97932560}" type="datetimeFigureOut">
               <a:rPr lang="en-GB" smtClean="0"/>
-              <a:t>26/09/2018</a:t>
+              <a:t>03/10/2018</a:t>
             </a:fld>
             <a:endParaRPr lang="en-GB"/>
           </a:p>
@@ -1611,7 +1611,7 @@
           <a:p>
             <a:fld id="{E463ECBD-872A-4504-A641-A42C97932560}" type="datetimeFigureOut">
               <a:rPr lang="en-GB" smtClean="0"/>
-              <a:t>26/09/2018</a:t>
+              <a:t>03/10/2018</a:t>
             </a:fld>
             <a:endParaRPr lang="en-GB"/>
           </a:p>
@@ -1729,7 +1729,7 @@
           <a:p>
             <a:fld id="{E463ECBD-872A-4504-A641-A42C97932560}" type="datetimeFigureOut">
               <a:rPr lang="en-GB" smtClean="0"/>
-              <a:t>26/09/2018</a:t>
+              <a:t>03/10/2018</a:t>
             </a:fld>
             <a:endParaRPr lang="en-GB"/>
           </a:p>
@@ -1824,7 +1824,7 @@
           <a:p>
             <a:fld id="{E463ECBD-872A-4504-A641-A42C97932560}" type="datetimeFigureOut">
               <a:rPr lang="en-GB" smtClean="0"/>
-              <a:t>26/09/2018</a:t>
+              <a:t>03/10/2018</a:t>
             </a:fld>
             <a:endParaRPr lang="en-GB"/>
           </a:p>
@@ -2101,7 +2101,7 @@
           <a:p>
             <a:fld id="{E463ECBD-872A-4504-A641-A42C97932560}" type="datetimeFigureOut">
               <a:rPr lang="en-GB" smtClean="0"/>
-              <a:t>26/09/2018</a:t>
+              <a:t>03/10/2018</a:t>
             </a:fld>
             <a:endParaRPr lang="en-GB"/>
           </a:p>
@@ -2354,7 +2354,7 @@
           <a:p>
             <a:fld id="{E463ECBD-872A-4504-A641-A42C97932560}" type="datetimeFigureOut">
               <a:rPr lang="en-GB" smtClean="0"/>
-              <a:t>26/09/2018</a:t>
+              <a:t>03/10/2018</a:t>
             </a:fld>
             <a:endParaRPr lang="en-GB"/>
           </a:p>
@@ -2567,7 +2567,7 @@
           <a:p>
             <a:fld id="{E463ECBD-872A-4504-A641-A42C97932560}" type="datetimeFigureOut">
               <a:rPr lang="en-GB" smtClean="0"/>
-              <a:t>26/09/2018</a:t>
+              <a:t>03/10/2018</a:t>
             </a:fld>
             <a:endParaRPr lang="en-GB"/>
           </a:p>
@@ -3287,7 +3287,11 @@
             </a:pPr>
             <a:r>
               <a:rPr lang="en-US" dirty="0" smtClean="0"/>
-              <a:t>Identification of configuration and candidate guest OSs, evaluation of kernel patch variants</a:t>
+              <a:t>Identification of configuration and candidate guest OSs, evaluation of kernel patch </a:t>
+            </a:r>
+            <a:r>
+              <a:rPr lang="en-US" dirty="0" smtClean="0"/>
+              <a:t>variants</a:t>
             </a:r>
           </a:p>
           <a:p>
@@ -3296,24 +3300,12 @@
               <a:buChar char="•"/>
             </a:pPr>
             <a:r>
-              <a:rPr lang="en-US" dirty="0" smtClean="0"/>
-              <a:t>Basic tests with container Engines and RT run </a:t>
-            </a:r>
-            <a:r>
               <a:rPr lang="en-US" dirty="0"/>
-              <a:t>configuration, Basic latency tests finished, used hardware, i7 2Core 4 threads </a:t>
-            </a:r>
-            <a:r>
-              <a:rPr lang="en-US" dirty="0" err="1"/>
-              <a:t>Skylake</a:t>
-            </a:r>
-            <a:r>
-              <a:rPr lang="en-US" dirty="0"/>
-              <a:t> 16Gb RAM on Ubuntu 16.04 LTS </a:t>
-            </a:r>
-            <a:r>
-              <a:rPr lang="en-US" dirty="0" smtClean="0"/>
-              <a:t>host</a:t>
+              <a:t>A test script has been created to automatize the test </a:t>
+            </a:r>
+            <a:r>
+              <a:rPr lang="en-US" dirty="0" smtClean="0"/>
+              <a:t>execution, including automatic hardware detection</a:t>
             </a:r>
             <a:endParaRPr lang="en-US" dirty="0" smtClean="0"/>
           </a:p>
@@ -3324,11 +3316,15 @@
             </a:pPr>
             <a:r>
               <a:rPr lang="en-US" dirty="0" smtClean="0"/>
-              <a:t>A </a:t>
-            </a:r>
-            <a:r>
-              <a:rPr lang="en-US" dirty="0" smtClean="0"/>
-              <a:t>test script has been created to automatize the test execution</a:t>
+              <a:t>Basic and migration </a:t>
+            </a:r>
+            <a:r>
+              <a:rPr lang="en-US" dirty="0" smtClean="0"/>
+              <a:t>tests with container Engines and RT run </a:t>
+            </a:r>
+            <a:r>
+              <a:rPr lang="en-US" dirty="0" smtClean="0"/>
+              <a:t>configuration, run on bare-metal, AWS T3 and AWS C5</a:t>
             </a:r>
           </a:p>
           <a:p>
@@ -3338,7 +3334,23 @@
             </a:pPr>
             <a:r>
               <a:rPr lang="en-US" dirty="0" smtClean="0"/>
-              <a:t>Recreated images with newer OS versions and patches for performance comparison and tests (Ubuntu 18.04 LTS)</a:t>
+              <a:t>Recreated </a:t>
+            </a:r>
+            <a:r>
+              <a:rPr lang="en-US" dirty="0" smtClean="0"/>
+              <a:t>images with newer OS versions and patches for performance comparison </a:t>
+            </a:r>
+            <a:r>
+              <a:rPr lang="en-US" dirty="0" smtClean="0"/>
+              <a:t>and endurance </a:t>
+            </a:r>
+            <a:r>
+              <a:rPr lang="en-US" dirty="0" smtClean="0"/>
+              <a:t>tests (Ubuntu 18.04 LTS</a:t>
+            </a:r>
+            <a:r>
+              <a:rPr lang="en-US" dirty="0" smtClean="0"/>
+              <a:t>)</a:t>
             </a:r>
           </a:p>
           <a:p>
@@ -3347,50 +3359,9 @@
               <a:buChar char="•"/>
             </a:pPr>
             <a:r>
-              <a:rPr lang="en-US" dirty="0"/>
-              <a:t>Tests to be repeated on </a:t>
-            </a:r>
-            <a:r>
-              <a:rPr lang="en-US" dirty="0" smtClean="0"/>
-              <a:t>a</a:t>
-            </a:r>
-            <a:r>
-              <a:rPr lang="en-US" dirty="0" smtClean="0"/>
-              <a:t> bare </a:t>
-            </a:r>
-            <a:r>
-              <a:rPr lang="en-US" dirty="0" smtClean="0"/>
-              <a:t>metal server, </a:t>
-            </a:r>
-            <a:r>
-              <a:rPr lang="en-US" dirty="0"/>
-              <a:t>8 Core XEON </a:t>
-            </a:r>
-            <a:r>
-              <a:rPr lang="en-US" dirty="0" smtClean="0"/>
-              <a:t>with </a:t>
-            </a:r>
-            <a:r>
-              <a:rPr lang="en-US" dirty="0"/>
-              <a:t>two NUMA nodes and 24Gb </a:t>
-            </a:r>
-            <a:r>
-              <a:rPr lang="en-US" dirty="0" smtClean="0"/>
-              <a:t>RAM, in consideration of NUMA nodes</a:t>
-            </a:r>
-          </a:p>
-          <a:p>
-            <a:pPr marL="285750" indent="-285750">
-              <a:buFont typeface="Arial" panose="020B0604020202020204" pitchFamily="34" charset="0"/>
-              <a:buChar char="•"/>
-            </a:pPr>
-            <a:endParaRPr lang="en-US" dirty="0"/>
-          </a:p>
-          <a:p>
-            <a:pPr marL="285750" indent="-285750">
-              <a:buFont typeface="Arial" panose="020B0604020202020204" pitchFamily="34" charset="0"/>
-              <a:buChar char="•"/>
-            </a:pPr>
+              <a:rPr lang="en-US" dirty="0" smtClean="0"/>
+              <a:t>Paper submitted documenting the feasibility evaluation of migrating from bare metal to a virtualized IAAS infrastructure, ICSE – SEIP ‘19</a:t>
+            </a:r>
             <a:endParaRPr lang="en-US" dirty="0"/>
           </a:p>
         </p:txBody>
@@ -3422,317 +3393,6 @@
           <a:xfrm>
             <a:off x="5783196" y="963039"/>
             <a:ext cx="4284932" cy="3383421"/>
-          </a:xfrm>
-        </p:spPr>
-      </p:pic>
-      <p:pic>
-        <p:nvPicPr>
-          <p:cNvPr id="10" name="Picture Placeholder 2"/>
-          <p:cNvPicPr>
-            <a:picLocks noChangeAspect="1"/>
-          </p:cNvPicPr>
-          <p:nvPr/>
-        </p:nvPicPr>
-        <p:blipFill rotWithShape="1">
-          <a:blip r:embed="rId3">
-            <a:extLst>
-              <a:ext uri="{28A0092B-C50C-407E-A947-70E740481C1C}">
-                <a14:useLocalDpi xmlns:a14="http://schemas.microsoft.com/office/drawing/2010/main" val="0"/>
-              </a:ext>
-            </a:extLst>
-          </a:blip>
-          <a:srcRect l="-11" t="25242" r="11" b="25205"/>
-          <a:stretch/>
-        </p:blipFill>
-        <p:spPr>
-          <a:xfrm>
-            <a:off x="5784128" y="4454188"/>
-            <a:ext cx="4284000" cy="1414800"/>
-          </a:xfrm>
-          <a:prstGeom prst="rect">
-            <a:avLst/>
-          </a:prstGeom>
-          <a:effectLst>
-            <a:glow>
-              <a:schemeClr val="bg1"/>
-            </a:glow>
-          </a:effectLst>
-        </p:spPr>
-      </p:pic>
-    </p:spTree>
-    <p:extLst>
-      <p:ext uri="{BB962C8B-B14F-4D97-AF65-F5344CB8AC3E}">
-        <p14:creationId xmlns:p14="http://schemas.microsoft.com/office/powerpoint/2010/main" val="60013522"/>
-      </p:ext>
-    </p:extLst>
-  </p:cSld>
-  <p:clrMapOvr>
-    <a:masterClrMapping/>
-  </p:clrMapOvr>
-</p:sld>
-</file>
-
-<file path=ppt/slides/slide3.xml><?xml version="1.0" encoding="utf-8"?>
-<p:sld xmlns:a="http://schemas.openxmlformats.org/drawingml/2006/main" xmlns:r="http://schemas.openxmlformats.org/officeDocument/2006/relationships" xmlns:p="http://schemas.openxmlformats.org/presentationml/2006/main">
-  <p:cSld>
-    <p:spTree>
-      <p:nvGrpSpPr>
-        <p:cNvPr id="1" name=""/>
-        <p:cNvGrpSpPr/>
-        <p:nvPr/>
-      </p:nvGrpSpPr>
-      <p:grpSpPr>
-        <a:xfrm>
-          <a:off x="0" y="0"/>
-          <a:ext cx="0" cy="0"/>
-          <a:chOff x="0" y="0"/>
-          <a:chExt cx="0" cy="0"/>
-        </a:xfrm>
-      </p:grpSpPr>
-      <p:sp>
-        <p:nvSpPr>
-          <p:cNvPr id="15" name="Title 14"/>
-          <p:cNvSpPr>
-            <a:spLocks noGrp="1"/>
-          </p:cNvSpPr>
-          <p:nvPr>
-            <p:ph type="title"/>
-          </p:nvPr>
-        </p:nvSpPr>
-        <p:spPr>
-          <a:xfrm>
-            <a:off x="839788" y="457200"/>
-            <a:ext cx="4810999" cy="1600200"/>
-          </a:xfrm>
-        </p:spPr>
-        <p:txBody>
-          <a:bodyPr/>
-          <a:lstStyle/>
-          <a:p>
-            <a:r>
-              <a:rPr lang="en-US" dirty="0" smtClean="0"/>
-              <a:t>Progress of VM tests (now)</a:t>
-            </a:r>
-            <a:endParaRPr lang="en-GB" dirty="0"/>
-          </a:p>
-        </p:txBody>
-      </p:sp>
-      <p:sp>
-        <p:nvSpPr>
-          <p:cNvPr id="17" name="Text Placeholder 16"/>
-          <p:cNvSpPr>
-            <a:spLocks noGrp="1"/>
-          </p:cNvSpPr>
-          <p:nvPr>
-            <p:ph type="body" sz="half" idx="2"/>
-          </p:nvPr>
-        </p:nvSpPr>
-        <p:spPr>
-          <a:xfrm>
-            <a:off x="839788" y="2057400"/>
-            <a:ext cx="4810999" cy="3811588"/>
-          </a:xfrm>
-        </p:spPr>
-        <p:txBody>
-          <a:bodyPr>
-            <a:normAutofit/>
-          </a:bodyPr>
-          <a:lstStyle/>
-          <a:p>
-            <a:pPr marL="285750" indent="-285750">
-              <a:buFont typeface="Arial" panose="020B0604020202020204" pitchFamily="34" charset="0"/>
-              <a:buChar char="•"/>
-            </a:pPr>
-            <a:r>
-              <a:rPr lang="en-US" dirty="0"/>
-              <a:t>Replication of tests in the AWS cloud, C5 and generic </a:t>
-            </a:r>
-            <a:r>
-              <a:rPr lang="en-US" dirty="0" smtClean="0"/>
-              <a:t>instances</a:t>
-            </a:r>
-            <a:endParaRPr lang="en-US" dirty="0" smtClean="0"/>
-          </a:p>
-          <a:p>
-            <a:pPr marL="285750" indent="-285750">
-              <a:buFont typeface="Arial" panose="020B0604020202020204" pitchFamily="34" charset="0"/>
-              <a:buChar char="•"/>
-            </a:pPr>
-            <a:r>
-              <a:rPr lang="en-US" dirty="0" smtClean="0"/>
-              <a:t>Conclusion </a:t>
-            </a:r>
-            <a:r>
-              <a:rPr lang="en-US" dirty="0" smtClean="0"/>
-              <a:t>of </a:t>
-            </a:r>
-            <a:r>
-              <a:rPr lang="en-US" dirty="0"/>
-              <a:t>paper 1</a:t>
-            </a:r>
-            <a:r>
-              <a:rPr lang="en-US" dirty="0" smtClean="0"/>
-              <a:t>, publication of results </a:t>
-            </a:r>
-            <a:r>
-              <a:rPr lang="en-US" dirty="0" smtClean="0"/>
-              <a:t>evaluation of RT migration</a:t>
-            </a:r>
-            <a:r>
-              <a:rPr lang="en-US" dirty="0"/>
-              <a:t>, SEIP (Deadline </a:t>
-            </a:r>
-            <a:r>
-              <a:rPr lang="en-US" dirty="0" smtClean="0"/>
-              <a:t>1</a:t>
-            </a:r>
-            <a:r>
-              <a:rPr lang="en-US" baseline="30000" dirty="0" smtClean="0"/>
-              <a:t>st</a:t>
-            </a:r>
-            <a:r>
-              <a:rPr lang="en-US" dirty="0" smtClean="0"/>
-              <a:t> October </a:t>
-            </a:r>
-            <a:r>
-              <a:rPr lang="en-US" dirty="0"/>
-              <a:t>AOE</a:t>
-            </a:r>
-            <a:r>
-              <a:rPr lang="en-US" dirty="0" smtClean="0"/>
-              <a:t>)</a:t>
-            </a:r>
-            <a:endParaRPr lang="en-US" dirty="0" smtClean="0"/>
-          </a:p>
-          <a:p>
-            <a:pPr marL="285750" indent="-285750">
-              <a:buFont typeface="Arial" panose="020B0604020202020204" pitchFamily="34" charset="0"/>
-              <a:buChar char="•"/>
-            </a:pPr>
-            <a:r>
-              <a:rPr lang="en-US" dirty="0" smtClean="0"/>
-              <a:t>Test execution script to be extended to automatically detect </a:t>
-            </a:r>
-            <a:r>
-              <a:rPr lang="en-US" dirty="0" smtClean="0"/>
-              <a:t>hardware, </a:t>
-            </a:r>
-            <a:r>
-              <a:rPr lang="en-US" dirty="0" smtClean="0"/>
-              <a:t>extension with </a:t>
-            </a:r>
-            <a:r>
-              <a:rPr lang="en-US" dirty="0"/>
-              <a:t>parameters and selective </a:t>
-            </a:r>
-            <a:r>
-              <a:rPr lang="en-US" dirty="0" smtClean="0"/>
-              <a:t>execution</a:t>
-            </a:r>
-            <a:endParaRPr lang="en-US" dirty="0" smtClean="0"/>
-          </a:p>
-          <a:p>
-            <a:pPr marL="285750" indent="-285750">
-              <a:buFont typeface="Arial" panose="020B0604020202020204" pitchFamily="34" charset="0"/>
-              <a:buChar char="•"/>
-            </a:pPr>
-            <a:r>
-              <a:rPr lang="en-US" dirty="0" smtClean="0"/>
-              <a:t>Configuration </a:t>
-            </a:r>
-            <a:r>
-              <a:rPr lang="en-US" dirty="0" smtClean="0"/>
-              <a:t>of a new test suite for endurance tests and more detailed evaluation of overshoots: Comparison Bare </a:t>
-            </a:r>
-            <a:r>
-              <a:rPr lang="en-US" dirty="0" smtClean="0"/>
-              <a:t>Metal </a:t>
-            </a:r>
-            <a:r>
-              <a:rPr lang="en-US" dirty="0" smtClean="0"/>
-              <a:t>vs. AWS T3 vs. AWS C5</a:t>
-            </a:r>
-            <a:endParaRPr lang="en-US" dirty="0" smtClean="0"/>
-          </a:p>
-          <a:p>
-            <a:pPr marL="285750" indent="-285750">
-              <a:buFont typeface="Arial" panose="020B0604020202020204" pitchFamily="34" charset="0"/>
-              <a:buChar char="•"/>
-            </a:pPr>
-            <a:r>
-              <a:rPr lang="en-US" dirty="0" smtClean="0"/>
-              <a:t>Comparison </a:t>
-            </a:r>
-            <a:r>
-              <a:rPr lang="en-US" dirty="0"/>
-              <a:t>of results and evaluation of possibilities</a:t>
-            </a:r>
-          </a:p>
-          <a:p>
-            <a:pPr marL="285750" indent="-285750">
-              <a:buFont typeface="Arial" panose="020B0604020202020204" pitchFamily="34" charset="0"/>
-              <a:buChar char="•"/>
-            </a:pPr>
-            <a:r>
-              <a:rPr lang="en-US" dirty="0"/>
-              <a:t>Conclusion of paper 2, publication of results latency evaluation, </a:t>
-            </a:r>
-            <a:r>
-              <a:rPr lang="en-US" dirty="0" smtClean="0"/>
-              <a:t>RTASS (Deadline 17</a:t>
-            </a:r>
-            <a:r>
-              <a:rPr lang="en-US" baseline="30000" dirty="0" smtClean="0"/>
-              <a:t>th</a:t>
-            </a:r>
-            <a:r>
-              <a:rPr lang="en-US" dirty="0" smtClean="0"/>
-              <a:t> October AOE)</a:t>
-            </a:r>
-            <a:endParaRPr lang="en-US" dirty="0"/>
-          </a:p>
-          <a:p>
-            <a:pPr marL="285750" indent="-285750">
-              <a:buFont typeface="Arial" panose="020B0604020202020204" pitchFamily="34" charset="0"/>
-              <a:buChar char="•"/>
-            </a:pPr>
-            <a:endParaRPr lang="en-US" dirty="0" smtClean="0"/>
-          </a:p>
-          <a:p>
-            <a:pPr marL="285750" indent="-285750">
-              <a:buFont typeface="Arial" panose="020B0604020202020204" pitchFamily="34" charset="0"/>
-              <a:buChar char="•"/>
-            </a:pPr>
-            <a:endParaRPr lang="en-US" dirty="0" smtClean="0"/>
-          </a:p>
-        </p:txBody>
-      </p:sp>
-      <p:pic>
-        <p:nvPicPr>
-          <p:cNvPr id="5" name="Picture Placeholder 2"/>
-          <p:cNvPicPr>
-            <a:picLocks noGrp="1" noChangeAspect="1"/>
-          </p:cNvPicPr>
-          <p:nvPr>
-            <p:ph type="pic" idx="1"/>
-          </p:nvPr>
-        </p:nvPicPr>
-        <p:blipFill>
-          <a:blip r:embed="rId2">
-            <a:extLst>
-              <a:ext uri="{28A0092B-C50C-407E-A947-70E740481C1C}">
-                <a14:useLocalDpi xmlns:a14="http://schemas.microsoft.com/office/drawing/2010/main" val="0"/>
-              </a:ext>
-            </a:extLst>
-          </a:blip>
-          <a:stretch>
-            <a:fillRect/>
-          </a:stretch>
-        </p:blipFill>
-        <p:spPr>
-          <a:xfrm>
-            <a:off x="5823399" y="963039"/>
-            <a:ext cx="4204526" cy="3383421"/>
           </a:xfrm>
         </p:spPr>
       </p:pic>
@@ -3769,6 +3429,294 @@
     </p:spTree>
     <p:extLst>
       <p:ext uri="{BB962C8B-B14F-4D97-AF65-F5344CB8AC3E}">
+        <p14:creationId xmlns:p14="http://schemas.microsoft.com/office/powerpoint/2010/main" val="60013522"/>
+      </p:ext>
+    </p:extLst>
+  </p:cSld>
+  <p:clrMapOvr>
+    <a:masterClrMapping/>
+  </p:clrMapOvr>
+</p:sld>
+</file>
+
+<file path=ppt/slides/slide3.xml><?xml version="1.0" encoding="utf-8"?>
+<p:sld xmlns:a="http://schemas.openxmlformats.org/drawingml/2006/main" xmlns:r="http://schemas.openxmlformats.org/officeDocument/2006/relationships" xmlns:p="http://schemas.openxmlformats.org/presentationml/2006/main">
+  <p:cSld>
+    <p:spTree>
+      <p:nvGrpSpPr>
+        <p:cNvPr id="1" name=""/>
+        <p:cNvGrpSpPr/>
+        <p:nvPr/>
+      </p:nvGrpSpPr>
+      <p:grpSpPr>
+        <a:xfrm>
+          <a:off x="0" y="0"/>
+          <a:ext cx="0" cy="0"/>
+          <a:chOff x="0" y="0"/>
+          <a:chExt cx="0" cy="0"/>
+        </a:xfrm>
+      </p:grpSpPr>
+      <p:sp>
+        <p:nvSpPr>
+          <p:cNvPr id="15" name="Title 14"/>
+          <p:cNvSpPr>
+            <a:spLocks noGrp="1"/>
+          </p:cNvSpPr>
+          <p:nvPr>
+            <p:ph type="title"/>
+          </p:nvPr>
+        </p:nvSpPr>
+        <p:spPr>
+          <a:xfrm>
+            <a:off x="839788" y="457200"/>
+            <a:ext cx="4810999" cy="1600200"/>
+          </a:xfrm>
+        </p:spPr>
+        <p:txBody>
+          <a:bodyPr/>
+          <a:lstStyle/>
+          <a:p>
+            <a:r>
+              <a:rPr lang="en-US" dirty="0" smtClean="0"/>
+              <a:t>Progress </a:t>
+            </a:r>
+            <a:r>
+              <a:rPr lang="en-US" dirty="0" smtClean="0"/>
+              <a:t>of tests </a:t>
+            </a:r>
+            <a:r>
+              <a:rPr lang="en-US" dirty="0" smtClean="0"/>
+              <a:t>(now)</a:t>
+            </a:r>
+            <a:endParaRPr lang="en-GB" dirty="0"/>
+          </a:p>
+        </p:txBody>
+      </p:sp>
+      <p:sp>
+        <p:nvSpPr>
+          <p:cNvPr id="17" name="Text Placeholder 16"/>
+          <p:cNvSpPr>
+            <a:spLocks noGrp="1"/>
+          </p:cNvSpPr>
+          <p:nvPr>
+            <p:ph type="body" sz="half" idx="2"/>
+          </p:nvPr>
+        </p:nvSpPr>
+        <p:spPr>
+          <a:xfrm>
+            <a:off x="839788" y="2057400"/>
+            <a:ext cx="4810999" cy="3811588"/>
+          </a:xfrm>
+        </p:spPr>
+        <p:txBody>
+          <a:bodyPr>
+            <a:normAutofit lnSpcReduction="10000"/>
+          </a:bodyPr>
+          <a:lstStyle/>
+          <a:p>
+            <a:pPr marL="285750" indent="-285750">
+              <a:buFont typeface="Arial" panose="020B0604020202020204" pitchFamily="34" charset="0"/>
+              <a:buChar char="•"/>
+            </a:pPr>
+            <a:r>
+              <a:rPr lang="en-US" dirty="0"/>
+              <a:t>Selection and deployment of a monitoring </a:t>
+            </a:r>
+            <a:r>
+              <a:rPr lang="en-US" dirty="0" smtClean="0"/>
+              <a:t>system</a:t>
+            </a:r>
+            <a:endParaRPr lang="en-US" dirty="0" smtClean="0"/>
+          </a:p>
+          <a:p>
+            <a:pPr marL="285750" indent="-285750">
+              <a:buFont typeface="Arial" panose="020B0604020202020204" pitchFamily="34" charset="0"/>
+              <a:buChar char="•"/>
+            </a:pPr>
+            <a:r>
+              <a:rPr lang="en-US" dirty="0" smtClean="0"/>
+              <a:t>Configuration </a:t>
+            </a:r>
+            <a:r>
+              <a:rPr lang="en-US" dirty="0" smtClean="0"/>
+              <a:t>of a new test </a:t>
+            </a:r>
+            <a:r>
+              <a:rPr lang="en-US" dirty="0" smtClean="0"/>
+              <a:t>suite (script) </a:t>
+            </a:r>
+            <a:r>
+              <a:rPr lang="en-US" dirty="0" smtClean="0"/>
+              <a:t>for endurance tests and more detailed evaluation of overshoots: Comparison Bare Metal vs. AWS T3 vs. AWS C5</a:t>
+            </a:r>
+          </a:p>
+          <a:p>
+            <a:pPr marL="285750" indent="-285750">
+              <a:buFont typeface="Arial" panose="020B0604020202020204" pitchFamily="34" charset="0"/>
+              <a:buChar char="•"/>
+            </a:pPr>
+            <a:r>
+              <a:rPr lang="en-US" dirty="0" smtClean="0"/>
+              <a:t>Comparison of results and evaluation of possibilities</a:t>
+            </a:r>
+          </a:p>
+          <a:p>
+            <a:pPr marL="285750" indent="-285750">
+              <a:buFont typeface="Arial" panose="020B0604020202020204" pitchFamily="34" charset="0"/>
+              <a:buChar char="•"/>
+            </a:pPr>
+            <a:r>
+              <a:rPr lang="en-US" dirty="0" smtClean="0"/>
+              <a:t>Conclusion of paper 2, publication of results latency  and performance, </a:t>
+            </a:r>
+            <a:r>
+              <a:rPr lang="en-US" dirty="0" smtClean="0"/>
+              <a:t>soft/ hard limits </a:t>
+            </a:r>
+            <a:r>
+              <a:rPr lang="en-US" dirty="0" smtClean="0"/>
+              <a:t>evaluation, venue TBD</a:t>
+            </a:r>
+          </a:p>
+          <a:p>
+            <a:pPr marL="285750" indent="-285750">
+              <a:buFont typeface="Arial" panose="020B0604020202020204" pitchFamily="34" charset="0"/>
+              <a:buChar char="•"/>
+            </a:pPr>
+            <a:r>
+              <a:rPr lang="en-US" dirty="0" smtClean="0"/>
+              <a:t>Selection and deployment of a monitoring system</a:t>
+            </a:r>
+            <a:endParaRPr lang="en-US" dirty="0" smtClean="0"/>
+          </a:p>
+          <a:p>
+            <a:pPr marL="285750" indent="-285750">
+              <a:buFont typeface="Arial" panose="020B0604020202020204" pitchFamily="34" charset="0"/>
+              <a:buChar char="•"/>
+            </a:pPr>
+            <a:r>
+              <a:rPr lang="en-US" dirty="0" smtClean="0"/>
+              <a:t>Ideation </a:t>
+            </a:r>
+            <a:r>
+              <a:rPr lang="en-US" dirty="0"/>
+              <a:t>of a static offline schedule for a set of RT tasks per </a:t>
+            </a:r>
+            <a:r>
+              <a:rPr lang="en-US" dirty="0" smtClean="0"/>
+              <a:t>CPU, configuration and run of </a:t>
+            </a:r>
+            <a:r>
+              <a:rPr lang="en-US" dirty="0"/>
+              <a:t>such schedule using dummy counting instances (</a:t>
+            </a:r>
+            <a:r>
+              <a:rPr lang="en-US" dirty="0" err="1"/>
+              <a:t>rt</a:t>
+            </a:r>
+            <a:r>
+              <a:rPr lang="en-US" dirty="0"/>
+              <a:t>-app) </a:t>
+            </a:r>
+            <a:endParaRPr lang="en-US" dirty="0" smtClean="0"/>
+          </a:p>
+          <a:p>
+            <a:pPr marL="285750" indent="-285750">
+              <a:buFont typeface="Arial" panose="020B0604020202020204" pitchFamily="34" charset="0"/>
+              <a:buChar char="•"/>
+            </a:pPr>
+            <a:r>
+              <a:rPr lang="en-US" dirty="0" smtClean="0"/>
+              <a:t>Creation </a:t>
+            </a:r>
+            <a:r>
+              <a:rPr lang="en-US" dirty="0"/>
+              <a:t>of a simple orchestrator, application running in the same container </a:t>
+            </a:r>
+            <a:r>
+              <a:rPr lang="en-US" dirty="0" smtClean="0"/>
+              <a:t>space -&gt; IPC</a:t>
+            </a:r>
+            <a:endParaRPr lang="en-US" dirty="0"/>
+          </a:p>
+          <a:p>
+            <a:pPr marL="285750" indent="-285750">
+              <a:buFont typeface="Arial" panose="020B0604020202020204" pitchFamily="34" charset="0"/>
+              <a:buChar char="•"/>
+            </a:pPr>
+            <a:endParaRPr lang="en-US" dirty="0" smtClean="0"/>
+          </a:p>
+          <a:p>
+            <a:pPr marL="285750" indent="-285750">
+              <a:buFont typeface="Arial" panose="020B0604020202020204" pitchFamily="34" charset="0"/>
+              <a:buChar char="•"/>
+            </a:pPr>
+            <a:endParaRPr lang="en-US" dirty="0" smtClean="0"/>
+          </a:p>
+        </p:txBody>
+      </p:sp>
+      <p:pic>
+        <p:nvPicPr>
+          <p:cNvPr id="5" name="Picture Placeholder 2"/>
+          <p:cNvPicPr>
+            <a:picLocks noGrp="1" noChangeAspect="1"/>
+          </p:cNvPicPr>
+          <p:nvPr>
+            <p:ph type="pic" idx="1"/>
+          </p:nvPr>
+        </p:nvPicPr>
+        <p:blipFill>
+          <a:blip r:embed="rId2">
+            <a:extLst>
+              <a:ext uri="{28A0092B-C50C-407E-A947-70E740481C1C}">
+                <a14:useLocalDpi xmlns:a14="http://schemas.microsoft.com/office/drawing/2010/main" val="0"/>
+              </a:ext>
+            </a:extLst>
+          </a:blip>
+          <a:stretch>
+            <a:fillRect/>
+          </a:stretch>
+        </p:blipFill>
+        <p:spPr>
+          <a:xfrm>
+            <a:off x="5823399" y="963039"/>
+            <a:ext cx="4204526" cy="3383421"/>
+          </a:xfrm>
+        </p:spPr>
+      </p:pic>
+      <p:pic>
+        <p:nvPicPr>
+          <p:cNvPr id="2" name="Picture 1"/>
+          <p:cNvPicPr>
+            <a:picLocks noChangeAspect="1"/>
+          </p:cNvPicPr>
+          <p:nvPr/>
+        </p:nvPicPr>
+        <p:blipFill>
+          <a:blip r:embed="rId3">
+            <a:extLst>
+              <a:ext uri="{28A0092B-C50C-407E-A947-70E740481C1C}">
+                <a14:useLocalDpi xmlns:a14="http://schemas.microsoft.com/office/drawing/2010/main" val="0"/>
+              </a:ext>
+            </a:extLst>
+          </a:blip>
+          <a:stretch>
+            <a:fillRect/>
+          </a:stretch>
+        </p:blipFill>
+        <p:spPr>
+          <a:xfrm>
+            <a:off x="6944400" y="2411413"/>
+            <a:ext cx="4471745" cy="3457575"/>
+          </a:xfrm>
+          <a:prstGeom prst="rect">
+            <a:avLst/>
+          </a:prstGeom>
+        </p:spPr>
+      </p:pic>
+    </p:spTree>
+    <p:extLst>
+      <p:ext uri="{BB962C8B-B14F-4D97-AF65-F5344CB8AC3E}">
         <p14:creationId xmlns:p14="http://schemas.microsoft.com/office/powerpoint/2010/main" val="1141172646"/>
       </p:ext>
     </p:extLst>
@@ -3850,15 +3798,7 @@
               <a:buFont typeface="Arial" panose="020B0604020202020204" pitchFamily="34" charset="0"/>
               <a:buChar char="•"/>
             </a:pPr>
-            <a:r>
-              <a:rPr lang="en-US" dirty="0" smtClean="0"/>
-              <a:t>Next </a:t>
-            </a:r>
-            <a:r>
-              <a:rPr lang="en-US" dirty="0" smtClean="0"/>
-              <a:t>Group: Ideation of a static offline schedule for a set of RT tasks per CPU</a:t>
-            </a:r>
-            <a:endParaRPr lang="en-US" dirty="0"/>
+            <a:endParaRPr lang="en-US" dirty="0" smtClean="0"/>
           </a:p>
           <a:p>
             <a:pPr marL="285750" indent="-285750">
@@ -3866,32 +3806,16 @@
               <a:buChar char="•"/>
             </a:pPr>
             <a:r>
-              <a:rPr lang="en-US" dirty="0"/>
-              <a:t>Next Group: Configuration </a:t>
-            </a:r>
-            <a:r>
-              <a:rPr lang="en-US" dirty="0" smtClean="0"/>
-              <a:t>of such schedule using dummy counting instances (</a:t>
+              <a:rPr lang="en-US" dirty="0" smtClean="0"/>
+              <a:t>Study of Symmetric </a:t>
             </a:r>
             <a:r>
               <a:rPr lang="en-US" dirty="0" err="1" smtClean="0"/>
-              <a:t>rt</a:t>
-            </a:r>
-            <a:r>
-              <a:rPr lang="en-US" dirty="0" smtClean="0"/>
-              <a:t>-app) for each container, </a:t>
-            </a:r>
-            <a:r>
-              <a:rPr lang="en-US" dirty="0" smtClean="0"/>
-              <a:t>plus </a:t>
-            </a:r>
-            <a:r>
-              <a:rPr lang="en-US" dirty="0" smtClean="0"/>
-              <a:t>test </a:t>
-            </a:r>
-            <a:r>
-              <a:rPr lang="en-US" dirty="0" smtClean="0"/>
-              <a:t>run</a:t>
+              <a:t>MultiProcessing</a:t>
+            </a:r>
+            <a:r>
+              <a:rPr lang="en-US" dirty="0" smtClean="0"/>
+              <a:t> (SMP) Hard-real-time literature and algorithms (research status)</a:t>
             </a:r>
           </a:p>
           <a:p>
@@ -3901,7 +3825,7 @@
             </a:pPr>
             <a:r>
               <a:rPr lang="en-US" dirty="0" smtClean="0"/>
-              <a:t>Creation of a simple orchestrator, application running in the same container space</a:t>
+              <a:t>Introduction of dynamic SMP scheduling based on the standard EDF and CBS-GRUB algorithms</a:t>
             </a:r>
           </a:p>
           <a:p>
@@ -3911,7 +3835,22 @@
             </a:pPr>
             <a:r>
               <a:rPr lang="en-US" dirty="0" smtClean="0"/>
-              <a:t>Exploration of progress</a:t>
+              <a:t>Extension of the orchestrator, dynamic, performance oriented scheduling for the EDF case</a:t>
+            </a:r>
+            <a:endParaRPr lang="en-US" dirty="0"/>
+          </a:p>
+          <a:p>
+            <a:pPr marL="285750" indent="-285750">
+              <a:buFont typeface="Arial" panose="020B0604020202020204" pitchFamily="34" charset="0"/>
+              <a:buChar char="•"/>
+            </a:pPr>
+            <a:r>
+              <a:rPr lang="en-US" dirty="0" smtClean="0"/>
+              <a:t>Exploration </a:t>
+            </a:r>
+            <a:r>
+              <a:rPr lang="en-US" dirty="0" smtClean="0"/>
+              <a:t>of progress</a:t>
             </a:r>
             <a:r>
               <a:rPr lang="en-US" dirty="0"/>
@@ -3929,7 +3868,6 @@
               <a:rPr lang="en-US" dirty="0" smtClean="0"/>
               <a:t>-Kernels and alternatives</a:t>
             </a:r>
-            <a:endParaRPr lang="en-US" dirty="0" smtClean="0"/>
           </a:p>
           <a:p>
             <a:endParaRPr lang="en-US" dirty="0" smtClean="0"/>

</xml_diff>

<commit_message>
update slides status, notes inv sched
</commit_message>
<xml_diff>
--- a/slides/Progress of VM tests2.pptx
+++ b/slides/Progress of VM tests2.pptx
@@ -246,7 +246,7 @@
           <a:p>
             <a:fld id="{E463ECBD-872A-4504-A641-A42C97932560}" type="datetimeFigureOut">
               <a:rPr lang="en-GB" smtClean="0"/>
-              <a:t>03/10/2018</a:t>
+              <a:t>08/02/2019</a:t>
             </a:fld>
             <a:endParaRPr lang="en-GB"/>
           </a:p>
@@ -416,7 +416,7 @@
           <a:p>
             <a:fld id="{E463ECBD-872A-4504-A641-A42C97932560}" type="datetimeFigureOut">
               <a:rPr lang="en-GB" smtClean="0"/>
-              <a:t>03/10/2018</a:t>
+              <a:t>08/02/2019</a:t>
             </a:fld>
             <a:endParaRPr lang="en-GB"/>
           </a:p>
@@ -596,7 +596,7 @@
           <a:p>
             <a:fld id="{E463ECBD-872A-4504-A641-A42C97932560}" type="datetimeFigureOut">
               <a:rPr lang="en-GB" smtClean="0"/>
-              <a:t>03/10/2018</a:t>
+              <a:t>08/02/2019</a:t>
             </a:fld>
             <a:endParaRPr lang="en-GB"/>
           </a:p>
@@ -766,7 +766,7 @@
           <a:p>
             <a:fld id="{E463ECBD-872A-4504-A641-A42C97932560}" type="datetimeFigureOut">
               <a:rPr lang="en-GB" smtClean="0"/>
-              <a:t>03/10/2018</a:t>
+              <a:t>08/02/2019</a:t>
             </a:fld>
             <a:endParaRPr lang="en-GB"/>
           </a:p>
@@ -1012,7 +1012,7 @@
           <a:p>
             <a:fld id="{E463ECBD-872A-4504-A641-A42C97932560}" type="datetimeFigureOut">
               <a:rPr lang="en-GB" smtClean="0"/>
-              <a:t>03/10/2018</a:t>
+              <a:t>08/02/2019</a:t>
             </a:fld>
             <a:endParaRPr lang="en-GB"/>
           </a:p>
@@ -1244,7 +1244,7 @@
           <a:p>
             <a:fld id="{E463ECBD-872A-4504-A641-A42C97932560}" type="datetimeFigureOut">
               <a:rPr lang="en-GB" smtClean="0"/>
-              <a:t>03/10/2018</a:t>
+              <a:t>08/02/2019</a:t>
             </a:fld>
             <a:endParaRPr lang="en-GB"/>
           </a:p>
@@ -1611,7 +1611,7 @@
           <a:p>
             <a:fld id="{E463ECBD-872A-4504-A641-A42C97932560}" type="datetimeFigureOut">
               <a:rPr lang="en-GB" smtClean="0"/>
-              <a:t>03/10/2018</a:t>
+              <a:t>08/02/2019</a:t>
             </a:fld>
             <a:endParaRPr lang="en-GB"/>
           </a:p>
@@ -1729,7 +1729,7 @@
           <a:p>
             <a:fld id="{E463ECBD-872A-4504-A641-A42C97932560}" type="datetimeFigureOut">
               <a:rPr lang="en-GB" smtClean="0"/>
-              <a:t>03/10/2018</a:t>
+              <a:t>08/02/2019</a:t>
             </a:fld>
             <a:endParaRPr lang="en-GB"/>
           </a:p>
@@ -1824,7 +1824,7 @@
           <a:p>
             <a:fld id="{E463ECBD-872A-4504-A641-A42C97932560}" type="datetimeFigureOut">
               <a:rPr lang="en-GB" smtClean="0"/>
-              <a:t>03/10/2018</a:t>
+              <a:t>08/02/2019</a:t>
             </a:fld>
             <a:endParaRPr lang="en-GB"/>
           </a:p>
@@ -2101,7 +2101,7 @@
           <a:p>
             <a:fld id="{E463ECBD-872A-4504-A641-A42C97932560}" type="datetimeFigureOut">
               <a:rPr lang="en-GB" smtClean="0"/>
-              <a:t>03/10/2018</a:t>
+              <a:t>08/02/2019</a:t>
             </a:fld>
             <a:endParaRPr lang="en-GB"/>
           </a:p>
@@ -2354,7 +2354,7 @@
           <a:p>
             <a:fld id="{E463ECBD-872A-4504-A641-A42C97932560}" type="datetimeFigureOut">
               <a:rPr lang="en-GB" smtClean="0"/>
-              <a:t>03/10/2018</a:t>
+              <a:t>08/02/2019</a:t>
             </a:fld>
             <a:endParaRPr lang="en-GB"/>
           </a:p>
@@ -2567,7 +2567,7 @@
           <a:p>
             <a:fld id="{E463ECBD-872A-4504-A641-A42C97932560}" type="datetimeFigureOut">
               <a:rPr lang="en-GB" smtClean="0"/>
-              <a:t>03/10/2018</a:t>
+              <a:t>08/02/2019</a:t>
             </a:fld>
             <a:endParaRPr lang="en-GB"/>
           </a:p>
@@ -3277,7 +3277,7 @@
         </p:spPr>
         <p:txBody>
           <a:bodyPr>
-            <a:normAutofit/>
+            <a:normAutofit fontScale="92500" lnSpcReduction="10000"/>
           </a:bodyPr>
           <a:lstStyle/>
           <a:p>
@@ -3287,11 +3287,7 @@
             </a:pPr>
             <a:r>
               <a:rPr lang="en-US" dirty="0" smtClean="0"/>
-              <a:t>Identification of configuration and candidate guest OSs, evaluation of kernel patch </a:t>
-            </a:r>
-            <a:r>
-              <a:rPr lang="en-US" dirty="0" smtClean="0"/>
-              <a:t>variants</a:t>
+              <a:t>Identification of configuration, guest OS and kernel patch, + automatic test script</a:t>
             </a:r>
           </a:p>
           <a:p>
@@ -3300,14 +3296,9 @@
               <a:buChar char="•"/>
             </a:pPr>
             <a:r>
-              <a:rPr lang="en-US" dirty="0"/>
-              <a:t>A test script has been created to automatize the test </a:t>
-            </a:r>
-            <a:r>
-              <a:rPr lang="en-US" dirty="0" smtClean="0"/>
-              <a:t>execution, including automatic hardware detection</a:t>
-            </a:r>
-            <a:endParaRPr lang="en-US" dirty="0" smtClean="0"/>
+              <a:rPr lang="en-US" dirty="0" smtClean="0"/>
+              <a:t>Basic and migration tests with container Engines and RT run configuration, run on bare-metal, AWS T3 and AWS C5</a:t>
+            </a:r>
           </a:p>
           <a:p>
             <a:pPr marL="285750" indent="-285750">
@@ -3315,16 +3306,20 @@
               <a:buChar char="•"/>
             </a:pPr>
             <a:r>
-              <a:rPr lang="en-US" dirty="0" smtClean="0"/>
-              <a:t>Basic and migration </a:t>
-            </a:r>
-            <a:r>
-              <a:rPr lang="en-US" dirty="0" smtClean="0"/>
-              <a:t>tests with container Engines and RT run </a:t>
-            </a:r>
-            <a:r>
-              <a:rPr lang="en-US" dirty="0" smtClean="0"/>
-              <a:t>configuration, run on bare-metal, AWS T3 and AWS C5</a:t>
+              <a:rPr lang="en-US"/>
+              <a:t>Paper </a:t>
+            </a:r>
+            <a:r>
+              <a:rPr lang="en-US" smtClean="0"/>
+              <a:t>revised, </a:t>
+            </a:r>
+            <a:r>
+              <a:rPr lang="en-US" dirty="0"/>
+              <a:t>additional tests, documenting the feasibility evaluation of migrating from bare metal to a virtualized IAAS infrastructure, ICAC </a:t>
+            </a:r>
+            <a:r>
+              <a:rPr lang="en-US" dirty="0" smtClean="0"/>
+              <a:t>2019</a:t>
             </a:r>
           </a:p>
           <a:p>
@@ -3334,23 +3329,7 @@
             </a:pPr>
             <a:r>
               <a:rPr lang="en-US" dirty="0" smtClean="0"/>
-              <a:t>Recreated </a:t>
-            </a:r>
-            <a:r>
-              <a:rPr lang="en-US" dirty="0" smtClean="0"/>
-              <a:t>images with newer OS versions and patches for performance comparison </a:t>
-            </a:r>
-            <a:r>
-              <a:rPr lang="en-US" dirty="0" smtClean="0"/>
-              <a:t>and endurance </a:t>
-            </a:r>
-            <a:r>
-              <a:rPr lang="en-US" dirty="0" smtClean="0"/>
-              <a:t>tests (Ubuntu 18.04 LTS</a:t>
-            </a:r>
-            <a:r>
-              <a:rPr lang="en-US" dirty="0" smtClean="0"/>
-              <a:t>)</a:t>
+              <a:t>Recreated images with newer OS versions and patches for performance comparison and endurance tests (Ubuntu 18.04 LTS)</a:t>
             </a:r>
           </a:p>
           <a:p>
@@ -3359,9 +3338,35 @@
               <a:buChar char="•"/>
             </a:pPr>
             <a:r>
-              <a:rPr lang="en-US" dirty="0" smtClean="0"/>
-              <a:t>Paper submitted documenting the feasibility evaluation of migrating from bare metal to a virtualized IAAS infrastructure, ICSE – SEIP ‘19</a:t>
-            </a:r>
+              <a:rPr lang="en-US" dirty="0"/>
+              <a:t>Selected and deployed monitoring system, </a:t>
+            </a:r>
+            <a:r>
+              <a:rPr lang="en-US" dirty="0" err="1" smtClean="0"/>
+              <a:t>Icinga</a:t>
+            </a:r>
+            <a:endParaRPr lang="en-US" dirty="0" smtClean="0"/>
+          </a:p>
+          <a:p>
+            <a:pPr marL="285750" indent="-285750">
+              <a:buFont typeface="Arial" panose="020B0604020202020204" pitchFamily="34" charset="0"/>
+              <a:buChar char="•"/>
+            </a:pPr>
+            <a:r>
+              <a:rPr lang="en-US" dirty="0"/>
+              <a:t>Ideation of a static offline schedule for a set of RT tasks per CPU, configuration and run of such schedule using dummy counting instances (</a:t>
+            </a:r>
+            <a:r>
+              <a:rPr lang="en-US" dirty="0" err="1"/>
+              <a:t>rt</a:t>
+            </a:r>
+            <a:r>
+              <a:rPr lang="en-US" dirty="0"/>
+              <a:t>-app) </a:t>
+            </a:r>
+            <a:endParaRPr lang="en-US" dirty="0" smtClean="0"/>
+          </a:p>
+          <a:p>
             <a:endParaRPr lang="en-US" dirty="0"/>
           </a:p>
         </p:txBody>
@@ -3398,13 +3403,13 @@
       </p:pic>
       <p:pic>
         <p:nvPicPr>
-          <p:cNvPr id="6" name="Picture Placeholder 2"/>
+          <p:cNvPr id="2" name="Picture 1"/>
           <p:cNvPicPr>
             <a:picLocks noChangeAspect="1"/>
           </p:cNvPicPr>
           <p:nvPr/>
         </p:nvPicPr>
-        <p:blipFill>
+        <p:blipFill rotWithShape="1">
           <a:blip r:embed="rId3">
             <a:extLst>
               <a:ext uri="{28A0092B-C50C-407E-A947-70E740481C1C}">
@@ -3412,18 +3417,23 @@
               </a:ext>
             </a:extLst>
           </a:blip>
-          <a:stretch>
-            <a:fillRect/>
-          </a:stretch>
+          <a:srcRect l="3218" t="26263" r="2629" b="26528"/>
+          <a:stretch/>
         </p:blipFill>
         <p:spPr>
           <a:xfrm>
-            <a:off x="6945735" y="2330318"/>
-            <a:ext cx="4204526" cy="2737830"/>
+            <a:off x="7081023" y="3434576"/>
+            <a:ext cx="3958683" cy="1984917"/>
           </a:xfrm>
-          <a:prstGeom prst="rect">
+          <a:prstGeom prst="ellipse">
             <a:avLst/>
           </a:prstGeom>
+          <a:ln>
+            <a:noFill/>
+          </a:ln>
+          <a:effectLst>
+            <a:softEdge rad="112500"/>
+          </a:effectLst>
         </p:spPr>
       </p:pic>
     </p:spTree>
@@ -3482,11 +3492,11 @@
             </a:r>
             <a:r>
               <a:rPr lang="en-US" dirty="0" smtClean="0"/>
-              <a:t>of tests </a:t>
-            </a:r>
-            <a:r>
-              <a:rPr lang="en-US" dirty="0" smtClean="0"/>
-              <a:t>(now)</a:t>
+              <a:t>(</a:t>
+            </a:r>
+            <a:r>
+              <a:rPr lang="en-US" dirty="0" smtClean="0"/>
+              <a:t>now)</a:t>
             </a:r>
             <a:endParaRPr lang="en-GB" dirty="0"/>
           </a:p>
@@ -3510,7 +3520,7 @@
         </p:spPr>
         <p:txBody>
           <a:bodyPr>
-            <a:normAutofit lnSpcReduction="10000"/>
+            <a:normAutofit fontScale="92500" lnSpcReduction="20000"/>
           </a:bodyPr>
           <a:lstStyle/>
           <a:p>
@@ -3520,11 +3530,97 @@
             </a:pPr>
             <a:r>
               <a:rPr lang="en-US" dirty="0"/>
-              <a:t>Selection and deployment of a monitoring </a:t>
-            </a:r>
-            <a:r>
-              <a:rPr lang="en-US" dirty="0" smtClean="0"/>
-              <a:t>system</a:t>
+              <a:t>Creation of a simple orchestrator, application running in the same container space -&gt; </a:t>
+            </a:r>
+            <a:r>
+              <a:rPr lang="en-US" dirty="0" smtClean="0"/>
+              <a:t>IPC</a:t>
+            </a:r>
+          </a:p>
+          <a:p>
+            <a:pPr marL="742950" lvl="1" indent="-285750">
+              <a:buFont typeface="Arial" panose="020B0604020202020204" pitchFamily="34" charset="0"/>
+              <a:buChar char="•"/>
+            </a:pPr>
+            <a:r>
+              <a:rPr lang="en-US" dirty="0" smtClean="0"/>
+              <a:t>(</a:t>
+            </a:r>
+            <a:r>
+              <a:rPr lang="en-US" dirty="0"/>
+              <a:t>done</a:t>
+            </a:r>
+            <a:r>
+              <a:rPr lang="en-US" dirty="0" smtClean="0"/>
+              <a:t>) Process detection and listing</a:t>
+            </a:r>
+          </a:p>
+          <a:p>
+            <a:pPr marL="742950" lvl="1" indent="-285750">
+              <a:buFont typeface="Arial" panose="020B0604020202020204" pitchFamily="34" charset="0"/>
+              <a:buChar char="•"/>
+            </a:pPr>
+            <a:r>
+              <a:rPr lang="en-US" dirty="0" smtClean="0"/>
+              <a:t>(done) tests variation of scheduling parameters of running processes via orchestrator</a:t>
+            </a:r>
+          </a:p>
+          <a:p>
+            <a:pPr marL="742950" lvl="1" indent="-285750">
+              <a:buFont typeface="Arial" panose="020B0604020202020204" pitchFamily="34" charset="0"/>
+              <a:buChar char="•"/>
+            </a:pPr>
+            <a:r>
+              <a:rPr lang="en-US" dirty="0" smtClean="0"/>
+              <a:t>(done) tests process detection and simple parameter variation on a bare-metal 16 container (</a:t>
+            </a:r>
+            <a:r>
+              <a:rPr lang="en-US" dirty="0" err="1" smtClean="0"/>
+              <a:t>rt</a:t>
+            </a:r>
+            <a:r>
+              <a:rPr lang="en-US" dirty="0" smtClean="0"/>
+              <a:t>-app) instance</a:t>
+            </a:r>
+          </a:p>
+          <a:p>
+            <a:pPr marL="742950" lvl="1" indent="-285750">
+              <a:buFont typeface="Arial" panose="020B0604020202020204" pitchFamily="34" charset="0"/>
+              <a:buChar char="•"/>
+            </a:pPr>
+            <a:r>
+              <a:rPr lang="en-US" smtClean="0"/>
+              <a:t>(ongoing) Integration </a:t>
+            </a:r>
+            <a:r>
+              <a:rPr lang="en-US" dirty="0" smtClean="0"/>
+              <a:t>of configuration file support</a:t>
+            </a:r>
+          </a:p>
+          <a:p>
+            <a:pPr marL="742950" lvl="1" indent="-285750">
+              <a:buFont typeface="Arial" panose="020B0604020202020204" pitchFamily="34" charset="0"/>
+              <a:buChar char="•"/>
+            </a:pPr>
+            <a:r>
+              <a:rPr lang="en-US" dirty="0" smtClean="0"/>
+              <a:t>(ongoing) Integration of </a:t>
+            </a:r>
+            <a:r>
+              <a:rPr lang="en-US" dirty="0"/>
+              <a:t>round robin algorithm </a:t>
+            </a:r>
+            <a:r>
+              <a:rPr lang="en-US" dirty="0" smtClean="0"/>
+              <a:t>for resource distribution based on U</a:t>
+            </a:r>
+            <a:r>
+              <a:rPr lang="en-US" sz="1500" baseline="-25000" dirty="0" smtClean="0"/>
+              <a:t>L</a:t>
+            </a:r>
+            <a:r>
+              <a:rPr lang="en-US" sz="1500" dirty="0" smtClean="0"/>
+              <a:t> (utilization limit)</a:t>
             </a:r>
             <a:endParaRPr lang="en-US" dirty="0" smtClean="0"/>
           </a:p>
@@ -3535,19 +3631,69 @@
             </a:pPr>
             <a:r>
               <a:rPr lang="en-US" dirty="0" smtClean="0"/>
-              <a:t>Configuration </a:t>
-            </a:r>
-            <a:r>
-              <a:rPr lang="en-US" dirty="0" smtClean="0"/>
-              <a:t>of a new test </a:t>
-            </a:r>
-            <a:r>
-              <a:rPr lang="en-US" dirty="0" smtClean="0"/>
-              <a:t>suite (script) </a:t>
-            </a:r>
-            <a:r>
-              <a:rPr lang="en-US" dirty="0" smtClean="0"/>
-              <a:t>for endurance tests and more detailed evaluation of overshoots: Comparison Bare Metal vs. AWS T3 vs. AWS C5</a:t>
+              <a:t>Creation </a:t>
+            </a:r>
+            <a:r>
+              <a:rPr lang="en-US" dirty="0" smtClean="0"/>
+              <a:t>of a monitoring plugin for </a:t>
+            </a:r>
+            <a:r>
+              <a:rPr lang="en-US" dirty="0" err="1" smtClean="0"/>
+              <a:t>Icinga</a:t>
+            </a:r>
+            <a:r>
+              <a:rPr lang="en-US" dirty="0" smtClean="0"/>
+              <a:t> to parse real-time </a:t>
+            </a:r>
+            <a:r>
+              <a:rPr lang="en-US" dirty="0" smtClean="0"/>
+              <a:t>data</a:t>
+            </a:r>
+          </a:p>
+          <a:p>
+            <a:pPr marL="742950" lvl="1" indent="-285750">
+              <a:buFont typeface="Arial" panose="020B0604020202020204" pitchFamily="34" charset="0"/>
+              <a:buChar char="•"/>
+            </a:pPr>
+            <a:r>
+              <a:rPr lang="en-US" dirty="0" smtClean="0"/>
+              <a:t>(done) Plugin template tests</a:t>
+            </a:r>
+          </a:p>
+          <a:p>
+            <a:pPr marL="742950" lvl="1" indent="-285750">
+              <a:buFont typeface="Arial" panose="020B0604020202020204" pitchFamily="34" charset="0"/>
+              <a:buChar char="•"/>
+            </a:pPr>
+            <a:r>
+              <a:rPr lang="en-US" dirty="0" smtClean="0"/>
+              <a:t>(done) parsing and output tests with </a:t>
+            </a:r>
+            <a:r>
+              <a:rPr lang="en-US" dirty="0" err="1" smtClean="0"/>
+              <a:t>rt</a:t>
+            </a:r>
+            <a:r>
+              <a:rPr lang="en-US" dirty="0" smtClean="0"/>
+              <a:t>-app</a:t>
+            </a:r>
+          </a:p>
+          <a:p>
+            <a:pPr marL="742950" lvl="1" indent="-285750">
+              <a:buFont typeface="Arial" panose="020B0604020202020204" pitchFamily="34" charset="0"/>
+              <a:buChar char="•"/>
+            </a:pPr>
+            <a:r>
+              <a:rPr lang="en-US" dirty="0" smtClean="0"/>
+              <a:t>(ongoing) Log parsing and data transmission (requires changes in </a:t>
+            </a:r>
+            <a:r>
+              <a:rPr lang="en-US" dirty="0" err="1" smtClean="0"/>
+              <a:t>rt</a:t>
+            </a:r>
+            <a:r>
+              <a:rPr lang="en-US" dirty="0" smtClean="0"/>
+              <a:t>-app)</a:t>
             </a:r>
           </a:p>
           <a:p>
@@ -3556,88 +3702,20 @@
               <a:buChar char="•"/>
             </a:pPr>
             <a:r>
-              <a:rPr lang="en-US" dirty="0" smtClean="0"/>
-              <a:t>Comparison of results and evaluation of possibilities</a:t>
-            </a:r>
-          </a:p>
-          <a:p>
-            <a:pPr marL="285750" indent="-285750">
-              <a:buFont typeface="Arial" panose="020B0604020202020204" pitchFamily="34" charset="0"/>
-              <a:buChar char="•"/>
-            </a:pPr>
-            <a:r>
-              <a:rPr lang="en-US" dirty="0" smtClean="0"/>
-              <a:t>Conclusion of paper 2, publication of results latency  and performance, </a:t>
-            </a:r>
-            <a:r>
-              <a:rPr lang="en-US" dirty="0" smtClean="0"/>
-              <a:t>soft/ hard limits </a:t>
-            </a:r>
-            <a:r>
-              <a:rPr lang="en-US" dirty="0" smtClean="0"/>
-              <a:t>evaluation, venue TBD</a:t>
-            </a:r>
-          </a:p>
-          <a:p>
-            <a:pPr marL="285750" indent="-285750">
-              <a:buFont typeface="Arial" panose="020B0604020202020204" pitchFamily="34" charset="0"/>
-              <a:buChar char="•"/>
-            </a:pPr>
-            <a:r>
-              <a:rPr lang="en-US" dirty="0" smtClean="0"/>
-              <a:t>Selection and deployment of a monitoring system</a:t>
-            </a:r>
+              <a:rPr lang="en-US" dirty="0"/>
+              <a:t>Study of Symmetric </a:t>
+            </a:r>
+            <a:r>
+              <a:rPr lang="en-US" dirty="0" err="1"/>
+              <a:t>MultiProcessing</a:t>
+            </a:r>
+            <a:r>
+              <a:rPr lang="en-US" dirty="0"/>
+              <a:t> (SMP) Hard-real-time literature and algorithms (research status)</a:t>
+            </a:r>
+          </a:p>
+          <a:p>
             <a:endParaRPr lang="en-US" dirty="0" smtClean="0"/>
-          </a:p>
-          <a:p>
-            <a:pPr marL="285750" indent="-285750">
-              <a:buFont typeface="Arial" panose="020B0604020202020204" pitchFamily="34" charset="0"/>
-              <a:buChar char="•"/>
-            </a:pPr>
-            <a:r>
-              <a:rPr lang="en-US" dirty="0" smtClean="0"/>
-              <a:t>Ideation </a:t>
-            </a:r>
-            <a:r>
-              <a:rPr lang="en-US" dirty="0"/>
-              <a:t>of a static offline schedule for a set of RT tasks per </a:t>
-            </a:r>
-            <a:r>
-              <a:rPr lang="en-US" dirty="0" smtClean="0"/>
-              <a:t>CPU, configuration and run of </a:t>
-            </a:r>
-            <a:r>
-              <a:rPr lang="en-US" dirty="0"/>
-              <a:t>such schedule using dummy counting instances (</a:t>
-            </a:r>
-            <a:r>
-              <a:rPr lang="en-US" dirty="0" err="1"/>
-              <a:t>rt</a:t>
-            </a:r>
-            <a:r>
-              <a:rPr lang="en-US" dirty="0"/>
-              <a:t>-app) </a:t>
-            </a:r>
-            <a:endParaRPr lang="en-US" dirty="0" smtClean="0"/>
-          </a:p>
-          <a:p>
-            <a:pPr marL="285750" indent="-285750">
-              <a:buFont typeface="Arial" panose="020B0604020202020204" pitchFamily="34" charset="0"/>
-              <a:buChar char="•"/>
-            </a:pPr>
-            <a:r>
-              <a:rPr lang="en-US" dirty="0" smtClean="0"/>
-              <a:t>Creation </a:t>
-            </a:r>
-            <a:r>
-              <a:rPr lang="en-US" dirty="0"/>
-              <a:t>of a simple orchestrator, application running in the same container </a:t>
-            </a:r>
-            <a:r>
-              <a:rPr lang="en-US" dirty="0" smtClean="0"/>
-              <a:t>space -&gt; IPC</a:t>
-            </a:r>
-            <a:endParaRPr lang="en-US" dirty="0"/>
           </a:p>
           <a:p>
             <a:pPr marL="285750" indent="-285750">
@@ -3806,16 +3884,8 @@
               <a:buChar char="•"/>
             </a:pPr>
             <a:r>
-              <a:rPr lang="en-US" dirty="0" smtClean="0"/>
-              <a:t>Study of Symmetric </a:t>
-            </a:r>
-            <a:r>
-              <a:rPr lang="en-US" dirty="0" err="1" smtClean="0"/>
-              <a:t>MultiProcessing</a:t>
-            </a:r>
-            <a:r>
-              <a:rPr lang="en-US" dirty="0" smtClean="0"/>
-              <a:t> (SMP) Hard-real-time literature and algorithms (research status)</a:t>
+              <a:rPr lang="en-US" dirty="0"/>
+              <a:t>Configuration of a new test suite (script) for endurance tests and more detailed evaluation of overshoots: Comparison Bare Metal vs. AWS T3 vs. AWS C5</a:t>
             </a:r>
           </a:p>
           <a:p>
@@ -3824,8 +3894,8 @@
               <a:buChar char="•"/>
             </a:pPr>
             <a:r>
-              <a:rPr lang="en-US" dirty="0" smtClean="0"/>
-              <a:t>Introduction of dynamic SMP scheduling based on the standard EDF and CBS-GRUB algorithms</a:t>
+              <a:rPr lang="en-US" dirty="0"/>
+              <a:t>Comparison of results and evaluation of possibilities</a:t>
             </a:r>
           </a:p>
           <a:p>
@@ -3834,10 +3904,14 @@
               <a:buChar char="•"/>
             </a:pPr>
             <a:r>
-              <a:rPr lang="en-US" dirty="0" smtClean="0"/>
-              <a:t>Extension of the orchestrator, dynamic, performance oriented scheduling for the EDF case</a:t>
-            </a:r>
-            <a:endParaRPr lang="en-US" dirty="0"/>
+              <a:rPr lang="en-US" dirty="0"/>
+              <a:t>Conclusion of paper 2, publication of results latency  and performance, soft/ hard limits evaluation, venue </a:t>
+            </a:r>
+            <a:r>
+              <a:rPr lang="en-US" dirty="0" smtClean="0"/>
+              <a:t>TBD</a:t>
+            </a:r>
+            <a:endParaRPr lang="en-US" dirty="0" smtClean="0"/>
           </a:p>
           <a:p>
             <a:pPr marL="285750" indent="-285750">
@@ -3846,28 +3920,23 @@
             </a:pPr>
             <a:r>
               <a:rPr lang="en-US" dirty="0" smtClean="0"/>
-              <a:t>Exploration </a:t>
-            </a:r>
-            <a:r>
-              <a:rPr lang="en-US" dirty="0" smtClean="0"/>
-              <a:t>of progress</a:t>
-            </a:r>
-            <a:r>
-              <a:rPr lang="en-US" dirty="0"/>
-              <a:t>:</a:t>
-            </a:r>
-            <a:r>
-              <a:rPr lang="en-US" dirty="0" smtClean="0"/>
-              <a:t> Docker support for </a:t>
-            </a:r>
-            <a:r>
-              <a:rPr lang="en-US" dirty="0" err="1" smtClean="0"/>
-              <a:t>Uni</a:t>
-            </a:r>
-            <a:r>
-              <a:rPr lang="en-US" dirty="0" smtClean="0"/>
-              <a:t>-Kernels and alternatives</a:t>
-            </a:r>
+              <a:t>Introduction </a:t>
+            </a:r>
+            <a:r>
+              <a:rPr lang="en-US" dirty="0" smtClean="0"/>
+              <a:t>of dynamic SMP scheduling based on the standard EDF and CBS-GRUB algorithms</a:t>
+            </a:r>
+          </a:p>
+          <a:p>
+            <a:pPr marL="285750" indent="-285750">
+              <a:buFont typeface="Arial" panose="020B0604020202020204" pitchFamily="34" charset="0"/>
+              <a:buChar char="•"/>
+            </a:pPr>
+            <a:r>
+              <a:rPr lang="en-US" dirty="0" smtClean="0"/>
+              <a:t>Extension of the orchestrator, dynamic, performance oriented scheduling for the EDF case</a:t>
+            </a:r>
+            <a:endParaRPr lang="en-US" dirty="0"/>
           </a:p>
           <a:p>
             <a:endParaRPr lang="en-US" dirty="0" smtClean="0"/>

</xml_diff>